<commit_message>
Corrected error on powerpoint
</commit_message>
<xml_diff>
--- a/docs/presentation.pptx
+++ b/docs/presentation.pptx
@@ -333,7 +333,7 @@
           <a:p>
             <a:fld id="{9AB3A824-1A51-4B26-AD58-A6D8E14F6C04}" type="datetimeFigureOut">
               <a:rPr lang="en-US" dirty="0"/>
-              <a:t>3/12/2021</a:t>
+              <a:t>3/14/2021</a:t>
             </a:fld>
             <a:endParaRPr lang="en-US" dirty="0"/>
           </a:p>
@@ -667,7 +667,7 @@
           <a:p>
             <a:fld id="{D857E33E-8B18-4087-B112-809917729534}" type="datetimeFigureOut">
               <a:rPr lang="en-US" dirty="0"/>
-              <a:t>3/12/2021</a:t>
+              <a:t>3/14/2021</a:t>
             </a:fld>
             <a:endParaRPr lang="en-US" dirty="0"/>
           </a:p>
@@ -969,7 +969,7 @@
           <a:p>
             <a:fld id="{D3FFE419-2371-464F-8239-3959401C3561}" type="datetimeFigureOut">
               <a:rPr lang="en-US" dirty="0"/>
-              <a:t>3/12/2021</a:t>
+              <a:t>3/14/2021</a:t>
             </a:fld>
             <a:endParaRPr lang="en-US" dirty="0"/>
           </a:p>
@@ -1216,7 +1216,7 @@
           <a:p>
             <a:fld id="{97D162C4-EDD9-4389-A98B-B87ECEA2A816}" type="datetimeFigureOut">
               <a:rPr lang="en-US" dirty="0"/>
-              <a:t>3/12/2021</a:t>
+              <a:t>3/14/2021</a:t>
             </a:fld>
             <a:endParaRPr lang="en-US" dirty="0"/>
           </a:p>
@@ -1623,7 +1623,7 @@
           <a:p>
             <a:fld id="{3E5059C3-6A89-4494-99FF-5A4D6FFD50EB}" type="datetimeFigureOut">
               <a:rPr lang="en-US" dirty="0"/>
-              <a:t>3/12/2021</a:t>
+              <a:t>3/14/2021</a:t>
             </a:fld>
             <a:endParaRPr lang="en-US" dirty="0"/>
           </a:p>
@@ -1937,7 +1937,7 @@
           <a:p>
             <a:fld id="{CA954B2F-12DE-47F5-8894-472B206D2E1E}" type="datetimeFigureOut">
               <a:rPr lang="en-US" dirty="0"/>
-              <a:t>3/12/2021</a:t>
+              <a:t>3/14/2021</a:t>
             </a:fld>
             <a:endParaRPr lang="en-US" dirty="0"/>
           </a:p>
@@ -2481,7 +2481,7 @@
           <a:p>
             <a:fld id="{3F30E46F-7819-4ACF-B48B-48222C2ACC88}" type="datetimeFigureOut">
               <a:rPr lang="en-US" dirty="0"/>
-              <a:t>3/12/2021</a:t>
+              <a:t>3/14/2021</a:t>
             </a:fld>
             <a:endParaRPr lang="en-US" dirty="0"/>
           </a:p>
@@ -2676,7 +2676,7 @@
           <a:p>
             <a:fld id="{1FAF3416-4057-4DAA-829D-4CA07428D088}" type="datetimeFigureOut">
               <a:rPr lang="en-US" dirty="0"/>
-              <a:t>3/12/2021</a:t>
+              <a:t>3/14/2021</a:t>
             </a:fld>
             <a:endParaRPr lang="en-US" dirty="0"/>
           </a:p>
@@ -2889,7 +2889,7 @@
           <a:p>
             <a:fld id="{921D9284-D300-4297-87F7-E791DCC15DB1}" type="datetimeFigureOut">
               <a:rPr lang="en-US" dirty="0"/>
-              <a:t>3/12/2021</a:t>
+              <a:t>3/14/2021</a:t>
             </a:fld>
             <a:endParaRPr lang="en-US" dirty="0"/>
           </a:p>
@@ -3258,7 +3258,7 @@
           <a:p>
             <a:fld id="{37D525BB-DA17-4BA0-B3C8-3AC3ABC827E6}" type="datetimeFigureOut">
               <a:rPr lang="en-US" dirty="0"/>
-              <a:t>3/12/2021</a:t>
+              <a:t>3/14/2021</a:t>
             </a:fld>
             <a:endParaRPr lang="en-US" dirty="0"/>
           </a:p>
@@ -3661,7 +3661,7 @@
           <a:p>
             <a:fld id="{B16C4C9A-3960-41CF-A4E9-2A8FB932454B}" type="datetimeFigureOut">
               <a:rPr lang="en-US" dirty="0"/>
-              <a:t>3/12/2021</a:t>
+              <a:t>3/14/2021</a:t>
             </a:fld>
             <a:endParaRPr lang="en-US" dirty="0"/>
           </a:p>
@@ -3972,7 +3972,7 @@
           <a:p>
             <a:fld id="{3CBC1C18-307B-4F68-A007-B5B542270E8D}" type="datetimeFigureOut">
               <a:rPr lang="en-US" dirty="0"/>
-              <a:t>3/12/2021</a:t>
+              <a:t>3/14/2021</a:t>
             </a:fld>
             <a:endParaRPr lang="en-US" dirty="0"/>
           </a:p>
@@ -6199,7 +6199,7 @@
           <p:nvPr>
             <p:extLst>
               <p:ext uri="{D42A27DB-BD31-4B8C-83A1-F6EECF244321}">
-                <p14:modId xmlns:p14="http://schemas.microsoft.com/office/powerpoint/2010/main" val="1669763127"/>
+                <p14:modId xmlns:p14="http://schemas.microsoft.com/office/powerpoint/2010/main" val="1933664723"/>
               </p:ext>
             </p:extLst>
           </p:nvPr>
@@ -6585,7 +6585,37 @@
                           <a:ea typeface="+mn-ea"/>
                           <a:cs typeface="+mn-cs"/>
                         </a:rPr>
-                        <a:t>∀IZ, B[IZx,IXy-1]=IZ</a:t>
+                        <a:t>∀IZ, </a:t>
+                      </a:r>
+                      <a:r>
+                        <a:rPr lang="pt-PT" sz="900" b="0" i="0" kern="1200" dirty="0" err="1">
+                          <a:solidFill>
+                            <a:schemeClr val="tx1">
+                              <a:lumMod val="75000"/>
+                              <a:lumOff val="25000"/>
+                            </a:schemeClr>
+                          </a:solidFill>
+                          <a:effectLst/>
+                          <a:latin typeface="+mn-lt"/>
+                          <a:ea typeface="+mn-ea"/>
+                          <a:cs typeface="+mn-cs"/>
+                        </a:rPr>
+                        <a:t>While</a:t>
+                      </a:r>
+                      <a:r>
+                        <a:rPr lang="pt-PT" sz="900" b="0" i="0" kern="1200" dirty="0">
+                          <a:solidFill>
+                            <a:schemeClr val="tx1">
+                              <a:lumMod val="75000"/>
+                              <a:lumOff val="25000"/>
+                            </a:schemeClr>
+                          </a:solidFill>
+                          <a:effectLst/>
+                          <a:latin typeface="+mn-lt"/>
+                          <a:ea typeface="+mn-ea"/>
+                          <a:cs typeface="+mn-cs"/>
+                        </a:rPr>
+                        <a:t>(B[IZx-1,IZy] ∉ {“X”,”IZ”}) do B[IZx,IXy-1]=IZ</a:t>
                       </a:r>
                       <a:endParaRPr lang="pt-PT" sz="900" dirty="0">
                         <a:solidFill>
@@ -6874,7 +6904,37 @@
                           <a:ea typeface="+mn-ea"/>
                           <a:cs typeface="+mn-cs"/>
                         </a:rPr>
-                        <a:t>∀IZ, B[IZx,IXy+1]=IZ</a:t>
+                        <a:t>∀IZ, </a:t>
+                      </a:r>
+                      <a:r>
+                        <a:rPr lang="pt-PT" sz="900" b="0" i="0" kern="1200" dirty="0" err="1">
+                          <a:solidFill>
+                            <a:schemeClr val="tx1">
+                              <a:lumMod val="75000"/>
+                              <a:lumOff val="25000"/>
+                            </a:schemeClr>
+                          </a:solidFill>
+                          <a:effectLst/>
+                          <a:latin typeface="+mn-lt"/>
+                          <a:ea typeface="+mn-ea"/>
+                          <a:cs typeface="+mn-cs"/>
+                        </a:rPr>
+                        <a:t>While</a:t>
+                      </a:r>
+                      <a:r>
+                        <a:rPr lang="pt-PT" sz="900" b="0" i="0" kern="1200" dirty="0">
+                          <a:solidFill>
+                            <a:schemeClr val="tx1">
+                              <a:lumMod val="75000"/>
+                              <a:lumOff val="25000"/>
+                            </a:schemeClr>
+                          </a:solidFill>
+                          <a:effectLst/>
+                          <a:latin typeface="+mn-lt"/>
+                          <a:ea typeface="+mn-ea"/>
+                          <a:cs typeface="+mn-cs"/>
+                        </a:rPr>
+                        <a:t>(B[IZx+1,IZy] ∉ {“X”,”IZ”}) do  B[IZx,IXy+1]=IZ</a:t>
                       </a:r>
                       <a:endParaRPr lang="pt-PT" sz="900" dirty="0">
                         <a:solidFill>
@@ -7150,7 +7210,7 @@
                         <a:defRPr/>
                       </a:pPr>
                       <a:r>
-                        <a:rPr lang="pt-PT" sz="900" b="0" i="0" kern="1200">
+                        <a:rPr lang="pt-PT" sz="900" b="0" i="0" kern="1200" dirty="0">
                           <a:solidFill>
                             <a:schemeClr val="tx1">
                               <a:lumMod val="75000"/>
@@ -7162,9 +7222,39 @@
                           <a:ea typeface="+mn-ea"/>
                           <a:cs typeface="+mn-cs"/>
                         </a:rPr>
-                        <a:t>∀IZ, B[IZx-1,IXy]=IZ</a:t>
+                        <a:t>∀IZ, </a:t>
                       </a:r>
-                      <a:endParaRPr lang="pt-PT" sz="900">
+                      <a:r>
+                        <a:rPr lang="pt-PT" sz="900" b="0" i="0" kern="1200" dirty="0" err="1">
+                          <a:solidFill>
+                            <a:schemeClr val="tx1">
+                              <a:lumMod val="75000"/>
+                              <a:lumOff val="25000"/>
+                            </a:schemeClr>
+                          </a:solidFill>
+                          <a:effectLst/>
+                          <a:latin typeface="+mn-lt"/>
+                          <a:ea typeface="+mn-ea"/>
+                          <a:cs typeface="+mn-cs"/>
+                        </a:rPr>
+                        <a:t>While</a:t>
+                      </a:r>
+                      <a:r>
+                        <a:rPr lang="pt-PT" sz="900" b="0" i="0" kern="1200" dirty="0">
+                          <a:solidFill>
+                            <a:schemeClr val="tx1">
+                              <a:lumMod val="75000"/>
+                              <a:lumOff val="25000"/>
+                            </a:schemeClr>
+                          </a:solidFill>
+                          <a:effectLst/>
+                          <a:latin typeface="+mn-lt"/>
+                          <a:ea typeface="+mn-ea"/>
+                          <a:cs typeface="+mn-cs"/>
+                        </a:rPr>
+                        <a:t>(B[IZx,IZy-1] ∉ {“X”,”IZ”}) do B[IZx-1,IXy]=IZ</a:t>
+                      </a:r>
+                      <a:endParaRPr lang="pt-PT" sz="900" dirty="0">
                         <a:solidFill>
                           <a:schemeClr val="tx1">
                             <a:lumMod val="75000"/>
@@ -7174,7 +7264,7 @@
                       </a:endParaRPr>
                     </a:p>
                     <a:p>
-                      <a:endParaRPr lang="pt-PT" sz="900">
+                      <a:endParaRPr lang="pt-PT" sz="900" dirty="0">
                         <a:solidFill>
                           <a:schemeClr val="tx1">
                             <a:lumMod val="75000"/>
@@ -7470,7 +7560,7 @@
                         <a:defRPr/>
                       </a:pPr>
                       <a:r>
-                        <a:rPr lang="pt-PT" sz="900" b="0" i="0" kern="1200">
+                        <a:rPr lang="pt-PT" sz="900" b="0" i="0" kern="1200" dirty="0">
                           <a:solidFill>
                             <a:schemeClr val="tx1">
                               <a:lumMod val="75000"/>
@@ -7482,9 +7572,39 @@
                           <a:ea typeface="+mn-ea"/>
                           <a:cs typeface="+mn-cs"/>
                         </a:rPr>
-                        <a:t>∀IZ, B[IZx+1,IXy]=IZ</a:t>
+                        <a:t>∀IZ, </a:t>
                       </a:r>
-                      <a:endParaRPr lang="pt-PT" sz="900">
+                      <a:r>
+                        <a:rPr lang="pt-PT" sz="900" b="0" i="0" kern="1200" dirty="0" err="1">
+                          <a:solidFill>
+                            <a:schemeClr val="tx1">
+                              <a:lumMod val="75000"/>
+                              <a:lumOff val="25000"/>
+                            </a:schemeClr>
+                          </a:solidFill>
+                          <a:effectLst/>
+                          <a:latin typeface="+mn-lt"/>
+                          <a:ea typeface="+mn-ea"/>
+                          <a:cs typeface="+mn-cs"/>
+                        </a:rPr>
+                        <a:t>While</a:t>
+                      </a:r>
+                      <a:r>
+                        <a:rPr lang="pt-PT" sz="900" b="0" i="0" kern="1200" dirty="0">
+                          <a:solidFill>
+                            <a:schemeClr val="tx1">
+                              <a:lumMod val="75000"/>
+                              <a:lumOff val="25000"/>
+                            </a:schemeClr>
+                          </a:solidFill>
+                          <a:effectLst/>
+                          <a:latin typeface="+mn-lt"/>
+                          <a:ea typeface="+mn-ea"/>
+                          <a:cs typeface="+mn-cs"/>
+                        </a:rPr>
+                        <a:t>(B[IZx,IZy+1] ∉ {“X”,”IZ”}) do B[IZx+1,IXy]=IZ</a:t>
+                      </a:r>
+                      <a:endParaRPr lang="pt-PT" sz="900" dirty="0">
                         <a:solidFill>
                           <a:schemeClr val="tx1">
                             <a:lumMod val="75000"/>

</xml_diff>

<commit_message>
Pieces moving with keyboard arrows
</commit_message>
<xml_diff>
--- a/docs/presentation.pptx
+++ b/docs/presentation.pptx
@@ -334,7 +334,7 @@
           <a:p>
             <a:fld id="{9AB3A824-1A51-4B26-AD58-A6D8E14F6C04}" type="datetimeFigureOut">
               <a:rPr lang="en-US" dirty="0"/>
-              <a:t>3/18/2021</a:t>
+              <a:t>3/19/2021</a:t>
             </a:fld>
             <a:endParaRPr lang="en-US" dirty="0"/>
           </a:p>
@@ -668,7 +668,7 @@
           <a:p>
             <a:fld id="{D857E33E-8B18-4087-B112-809917729534}" type="datetimeFigureOut">
               <a:rPr lang="en-US" dirty="0"/>
-              <a:t>3/18/2021</a:t>
+              <a:t>3/19/2021</a:t>
             </a:fld>
             <a:endParaRPr lang="en-US" dirty="0"/>
           </a:p>
@@ -970,7 +970,7 @@
           <a:p>
             <a:fld id="{D3FFE419-2371-464F-8239-3959401C3561}" type="datetimeFigureOut">
               <a:rPr lang="en-US" dirty="0"/>
-              <a:t>3/18/2021</a:t>
+              <a:t>3/19/2021</a:t>
             </a:fld>
             <a:endParaRPr lang="en-US" dirty="0"/>
           </a:p>
@@ -1217,7 +1217,7 @@
           <a:p>
             <a:fld id="{97D162C4-EDD9-4389-A98B-B87ECEA2A816}" type="datetimeFigureOut">
               <a:rPr lang="en-US" dirty="0"/>
-              <a:t>3/18/2021</a:t>
+              <a:t>3/19/2021</a:t>
             </a:fld>
             <a:endParaRPr lang="en-US" dirty="0"/>
           </a:p>
@@ -1624,7 +1624,7 @@
           <a:p>
             <a:fld id="{3E5059C3-6A89-4494-99FF-5A4D6FFD50EB}" type="datetimeFigureOut">
               <a:rPr lang="en-US" dirty="0"/>
-              <a:t>3/18/2021</a:t>
+              <a:t>3/19/2021</a:t>
             </a:fld>
             <a:endParaRPr lang="en-US" dirty="0"/>
           </a:p>
@@ -1938,7 +1938,7 @@
           <a:p>
             <a:fld id="{CA954B2F-12DE-47F5-8894-472B206D2E1E}" type="datetimeFigureOut">
               <a:rPr lang="en-US" dirty="0"/>
-              <a:t>3/18/2021</a:t>
+              <a:t>3/19/2021</a:t>
             </a:fld>
             <a:endParaRPr lang="en-US" dirty="0"/>
           </a:p>
@@ -2482,7 +2482,7 @@
           <a:p>
             <a:fld id="{3F30E46F-7819-4ACF-B48B-48222C2ACC88}" type="datetimeFigureOut">
               <a:rPr lang="en-US" dirty="0"/>
-              <a:t>3/18/2021</a:t>
+              <a:t>3/19/2021</a:t>
             </a:fld>
             <a:endParaRPr lang="en-US" dirty="0"/>
           </a:p>
@@ -2677,7 +2677,7 @@
           <a:p>
             <a:fld id="{1FAF3416-4057-4DAA-829D-4CA07428D088}" type="datetimeFigureOut">
               <a:rPr lang="en-US" dirty="0"/>
-              <a:t>3/18/2021</a:t>
+              <a:t>3/19/2021</a:t>
             </a:fld>
             <a:endParaRPr lang="en-US" dirty="0"/>
           </a:p>
@@ -2890,7 +2890,7 @@
           <a:p>
             <a:fld id="{921D9284-D300-4297-87F7-E791DCC15DB1}" type="datetimeFigureOut">
               <a:rPr lang="en-US" dirty="0"/>
-              <a:t>3/18/2021</a:t>
+              <a:t>3/19/2021</a:t>
             </a:fld>
             <a:endParaRPr lang="en-US" dirty="0"/>
           </a:p>
@@ -3259,7 +3259,7 @@
           <a:p>
             <a:fld id="{37D525BB-DA17-4BA0-B3C8-3AC3ABC827E6}" type="datetimeFigureOut">
               <a:rPr lang="en-US" dirty="0"/>
-              <a:t>3/18/2021</a:t>
+              <a:t>3/19/2021</a:t>
             </a:fld>
             <a:endParaRPr lang="en-US" dirty="0"/>
           </a:p>
@@ -3662,7 +3662,7 @@
           <a:p>
             <a:fld id="{B16C4C9A-3960-41CF-A4E9-2A8FB932454B}" type="datetimeFigureOut">
               <a:rPr lang="en-US" dirty="0"/>
-              <a:t>3/18/2021</a:t>
+              <a:t>3/19/2021</a:t>
             </a:fld>
             <a:endParaRPr lang="en-US" dirty="0"/>
           </a:p>
@@ -3973,7 +3973,7 @@
           <a:p>
             <a:fld id="{3CBC1C18-307B-4F68-A007-B5B542270E8D}" type="datetimeFigureOut">
               <a:rPr lang="en-US" dirty="0"/>
-              <a:t>3/18/2021</a:t>
+              <a:t>3/19/2021</a:t>
             </a:fld>
             <a:endParaRPr lang="en-US" dirty="0"/>
           </a:p>
@@ -6072,7 +6072,7 @@
             </a:pPr>
             <a:r>
               <a:rPr lang="pt-PT" sz="1500" dirty="0"/>
-              <a:t>O tabuleiro de jogo é representado por uma matriz B quadrangular com Y colunas e Y linhas, 4&lt;Y&lt;6. Os valores de cada célula têm os seguintes valores:</a:t>
+              <a:t>O tabuleiro de jogo é representado por uma matriz B quadrangular com Y colunas e Y linhas, 4 &lt;= Y &lt;= 6. Os valores de cada célula têm os seguintes valores:</a:t>
             </a:r>
           </a:p>
           <a:p>

</xml_diff>

<commit_message>
Start display bfs with pygame
</commit_message>
<xml_diff>
--- a/docs/presentation.pptx
+++ b/docs/presentation.pptx
@@ -334,7 +334,7 @@
           <a:p>
             <a:fld id="{9AB3A824-1A51-4B26-AD58-A6D8E14F6C04}" type="datetimeFigureOut">
               <a:rPr lang="en-US" dirty="0"/>
-              <a:t>3/19/2021</a:t>
+              <a:t>3/20/2021</a:t>
             </a:fld>
             <a:endParaRPr lang="en-US" dirty="0"/>
           </a:p>
@@ -668,7 +668,7 @@
           <a:p>
             <a:fld id="{D857E33E-8B18-4087-B112-809917729534}" type="datetimeFigureOut">
               <a:rPr lang="en-US" dirty="0"/>
-              <a:t>3/19/2021</a:t>
+              <a:t>3/20/2021</a:t>
             </a:fld>
             <a:endParaRPr lang="en-US" dirty="0"/>
           </a:p>
@@ -970,7 +970,7 @@
           <a:p>
             <a:fld id="{D3FFE419-2371-464F-8239-3959401C3561}" type="datetimeFigureOut">
               <a:rPr lang="en-US" dirty="0"/>
-              <a:t>3/19/2021</a:t>
+              <a:t>3/20/2021</a:t>
             </a:fld>
             <a:endParaRPr lang="en-US" dirty="0"/>
           </a:p>
@@ -1217,7 +1217,7 @@
           <a:p>
             <a:fld id="{97D162C4-EDD9-4389-A98B-B87ECEA2A816}" type="datetimeFigureOut">
               <a:rPr lang="en-US" dirty="0"/>
-              <a:t>3/19/2021</a:t>
+              <a:t>3/20/2021</a:t>
             </a:fld>
             <a:endParaRPr lang="en-US" dirty="0"/>
           </a:p>
@@ -1624,7 +1624,7 @@
           <a:p>
             <a:fld id="{3E5059C3-6A89-4494-99FF-5A4D6FFD50EB}" type="datetimeFigureOut">
               <a:rPr lang="en-US" dirty="0"/>
-              <a:t>3/19/2021</a:t>
+              <a:t>3/20/2021</a:t>
             </a:fld>
             <a:endParaRPr lang="en-US" dirty="0"/>
           </a:p>
@@ -1938,7 +1938,7 @@
           <a:p>
             <a:fld id="{CA954B2F-12DE-47F5-8894-472B206D2E1E}" type="datetimeFigureOut">
               <a:rPr lang="en-US" dirty="0"/>
-              <a:t>3/19/2021</a:t>
+              <a:t>3/20/2021</a:t>
             </a:fld>
             <a:endParaRPr lang="en-US" dirty="0"/>
           </a:p>
@@ -2482,7 +2482,7 @@
           <a:p>
             <a:fld id="{3F30E46F-7819-4ACF-B48B-48222C2ACC88}" type="datetimeFigureOut">
               <a:rPr lang="en-US" dirty="0"/>
-              <a:t>3/19/2021</a:t>
+              <a:t>3/20/2021</a:t>
             </a:fld>
             <a:endParaRPr lang="en-US" dirty="0"/>
           </a:p>
@@ -2677,7 +2677,7 @@
           <a:p>
             <a:fld id="{1FAF3416-4057-4DAA-829D-4CA07428D088}" type="datetimeFigureOut">
               <a:rPr lang="en-US" dirty="0"/>
-              <a:t>3/19/2021</a:t>
+              <a:t>3/20/2021</a:t>
             </a:fld>
             <a:endParaRPr lang="en-US" dirty="0"/>
           </a:p>
@@ -2890,7 +2890,7 @@
           <a:p>
             <a:fld id="{921D9284-D300-4297-87F7-E791DCC15DB1}" type="datetimeFigureOut">
               <a:rPr lang="en-US" dirty="0"/>
-              <a:t>3/19/2021</a:t>
+              <a:t>3/20/2021</a:t>
             </a:fld>
             <a:endParaRPr lang="en-US" dirty="0"/>
           </a:p>
@@ -3259,7 +3259,7 @@
           <a:p>
             <a:fld id="{37D525BB-DA17-4BA0-B3C8-3AC3ABC827E6}" type="datetimeFigureOut">
               <a:rPr lang="en-US" dirty="0"/>
-              <a:t>3/19/2021</a:t>
+              <a:t>3/20/2021</a:t>
             </a:fld>
             <a:endParaRPr lang="en-US" dirty="0"/>
           </a:p>
@@ -3662,7 +3662,7 @@
           <a:p>
             <a:fld id="{B16C4C9A-3960-41CF-A4E9-2A8FB932454B}" type="datetimeFigureOut">
               <a:rPr lang="en-US" dirty="0"/>
-              <a:t>3/19/2021</a:t>
+              <a:t>3/20/2021</a:t>
             </a:fld>
             <a:endParaRPr lang="en-US" dirty="0"/>
           </a:p>
@@ -3973,7 +3973,7 @@
           <a:p>
             <a:fld id="{3CBC1C18-307B-4F68-A007-B5B542270E8D}" type="datetimeFigureOut">
               <a:rPr lang="en-US" dirty="0"/>
-              <a:t>3/19/2021</a:t>
+              <a:t>3/20/2021</a:t>
             </a:fld>
             <a:endParaRPr lang="en-US" dirty="0"/>
           </a:p>
@@ -6248,7 +6248,7 @@
                   </a:schemeClr>
                 </a:solidFill>
               </a:rPr>
-              <a:t>B = [  [ 'X’ , '-’ , '-’ , ‘Y’ ],</a:t>
+              <a:t>B = [  [ 'X’ , ‘X’ , '-’ , ‘X’ ],</a:t>
             </a:r>
           </a:p>
           <a:p>
@@ -6267,7 +6267,7 @@
                   </a:schemeClr>
                 </a:solidFill>
               </a:rPr>
-              <a:t>          [ ‘B’ , ’-’ , ’-’ , ’-’ ],</a:t>
+              <a:t>          [ ‘-’ , ’X’ , ’-’ , ’IP’ ],</a:t>
             </a:r>
           </a:p>
           <a:p>
@@ -6286,7 +6286,7 @@
                   </a:schemeClr>
                 </a:solidFill>
               </a:rPr>
-              <a:t>          [ 'X’ , 'BF’ , ‘-’ , ‘-’ ],</a:t>
+              <a:t>          [ ‘FP’ , ‘X’ , ‘IP’ , ‘X’ ],</a:t>
             </a:r>
           </a:p>
           <a:p>
@@ -6305,7 +6305,7 @@
                   </a:schemeClr>
                 </a:solidFill>
               </a:rPr>
-              <a:t>          [ ‘X’ , ’YF’ , ’-’ , ’-’ ] ]</a:t>
+              <a:t>          [ ‘-’ , ’-’ , ’-’ , ’FP’ ] ]</a:t>
             </a:r>
           </a:p>
         </p:txBody>
@@ -6355,7 +6355,7 @@
                   </a:schemeClr>
                 </a:solidFill>
               </a:rPr>
-              <a:t>B = [  [ 'X’ , '-’ , '-’ , ‘-’ ],</a:t>
+              <a:t>B = [  [ 'X’ , ‘X’ , '-’ , ‘X’ ],</a:t>
             </a:r>
           </a:p>
           <a:p>
@@ -6374,7 +6374,7 @@
                   </a:schemeClr>
                 </a:solidFill>
               </a:rPr>
-              <a:t>          [ ‘-’ , ’-’ , ’-’ , ’-’ ],</a:t>
+              <a:t>          [ ‘-’ , ’X’ , ’-’ , ’-’ ],</a:t>
             </a:r>
           </a:p>
           <a:p>
@@ -6393,7 +6393,7 @@
                   </a:schemeClr>
                 </a:solidFill>
               </a:rPr>
-              <a:t>          [ 'X’ , 'B’ , ‘-’ , ‘-’ ],</a:t>
+              <a:t>          [ ‘IPFP’ , ‘X’ , ‘-’ , ‘X’ ],</a:t>
             </a:r>
           </a:p>
           <a:p>
@@ -6412,7 +6412,7 @@
                   </a:schemeClr>
                 </a:solidFill>
               </a:rPr>
-              <a:t>          [ ‘X’ , ’Y’ , ’-’ , ’-’ ] ]</a:t>
+              <a:t>          [ ‘-’ , ’-’ , ’-’ , ’IPFP’ ] ]</a:t>
             </a:r>
           </a:p>
         </p:txBody>
@@ -6566,7 +6566,7 @@
         <p:spPr>
           <a:xfrm>
             <a:off x="1431732" y="5145775"/>
-            <a:ext cx="4721328" cy="1311000"/>
+            <a:ext cx="4721328" cy="1784976"/>
           </a:xfrm>
           <a:prstGeom prst="rect">
             <a:avLst/>
@@ -6608,7 +6608,7 @@
             </a:pPr>
             <a:r>
               <a:rPr lang="pt-PT" sz="1400" dirty="0"/>
-              <a:t>Número de estados finais (FZ) sozinhos (que não têm célula jogável (IZ) em cima).</a:t>
+              <a:t>f(n) = g(n) + h(n), onde g(n) é o custo do caminho desde o estado inicial até ao nó n e h(n) é uma função heurística que estima o custo do caminho mais barato desde n até ao estado objetivo.</a:t>
             </a:r>
           </a:p>
           <a:p>
@@ -6949,13 +6949,13 @@
           <p:nvPr>
             <p:extLst>
               <p:ext uri="{D42A27DB-BD31-4B8C-83A1-F6EECF244321}">
-                <p14:modId xmlns:p14="http://schemas.microsoft.com/office/powerpoint/2010/main" val="3330898760"/>
+                <p14:modId xmlns:p14="http://schemas.microsoft.com/office/powerpoint/2010/main" val="941513624"/>
               </p:ext>
             </p:extLst>
           </p:nvPr>
         </p:nvGraphicFramePr>
         <p:xfrm>
-          <a:off x="1575687" y="1313629"/>
+          <a:off x="1575687" y="1198489"/>
           <a:ext cx="9040628" cy="4820470"/>
         </p:xfrm>
         <a:graphic>
@@ -8157,7 +8157,7 @@
         </p:nvSpPr>
         <p:spPr>
           <a:xfrm>
-            <a:off x="5029200" y="890712"/>
+            <a:off x="1503485" y="6134099"/>
             <a:ext cx="5892799" cy="307777"/>
           </a:xfrm>
           <a:prstGeom prst="rect">
@@ -8259,7 +8259,7 @@
         <p:spPr>
           <a:xfrm>
             <a:off x="1642695" y="1231023"/>
-            <a:ext cx="8725267" cy="5478423"/>
+            <a:ext cx="8725267" cy="6124754"/>
           </a:xfrm>
           <a:prstGeom prst="rect">
             <a:avLst/>
@@ -8449,14 +8449,6 @@
             </a:r>
           </a:p>
           <a:p>
-            <a:pPr lvl="1">
-              <a:lnSpc>
-                <a:spcPct val="150000"/>
-              </a:lnSpc>
-            </a:pPr>
-            <a:endParaRPr lang="pt-PT" sz="1400" b="1" dirty="0"/>
-          </a:p>
-          <a:p>
             <a:pPr>
               <a:lnSpc>
                 <a:spcPct val="150000"/>
@@ -8490,8 +8482,44 @@
             </a:pPr>
             <a:r>
               <a:rPr lang="pt-PT" sz="1400" dirty="0"/>
-              <a:t>Verificação dos movimentos válidos.</a:t>
-            </a:r>
+              <a:t>Verificação dos movimentos válidos;</a:t>
+            </a:r>
+          </a:p>
+          <a:p>
+            <a:pPr marL="742950" lvl="1" indent="-285750">
+              <a:lnSpc>
+                <a:spcPct val="150000"/>
+              </a:lnSpc>
+              <a:buFont typeface="Wingdings" panose="05000000000000000000" pitchFamily="2" charset="2"/>
+              <a:buChar char="§"/>
+            </a:pPr>
+            <a:r>
+              <a:rPr lang="pt-PT" sz="1400" dirty="0"/>
+              <a:t>Modo de jogo individual;</a:t>
+            </a:r>
+          </a:p>
+          <a:p>
+            <a:pPr marL="742950" lvl="1" indent="-285750">
+              <a:lnSpc>
+                <a:spcPct val="150000"/>
+              </a:lnSpc>
+              <a:buFont typeface="Wingdings" panose="05000000000000000000" pitchFamily="2" charset="2"/>
+              <a:buChar char="§"/>
+            </a:pPr>
+            <a:r>
+              <a:rPr lang="pt-PT" sz="1400" dirty="0"/>
+              <a:t>Implementação do algoritmo BFS.</a:t>
+            </a:r>
+          </a:p>
+          <a:p>
+            <a:pPr marL="742950" lvl="1" indent="-285750">
+              <a:lnSpc>
+                <a:spcPct val="150000"/>
+              </a:lnSpc>
+              <a:buFont typeface="Wingdings" panose="05000000000000000000" pitchFamily="2" charset="2"/>
+              <a:buChar char="§"/>
+            </a:pPr>
+            <a:endParaRPr lang="pt-PT" sz="1400" dirty="0"/>
           </a:p>
           <a:p>
             <a:pPr marL="285750" indent="-285750">
@@ -8504,10 +8532,10 @@
       </p:sp>
       <p:pic>
         <p:nvPicPr>
-          <p:cNvPr id="5" name="Imagem 4">
+          <p:cNvPr id="6" name="Imagem 5">
             <a:extLst>
               <a:ext uri="{FF2B5EF4-FFF2-40B4-BE49-F238E27FC236}">
-                <a16:creationId xmlns:a16="http://schemas.microsoft.com/office/drawing/2014/main" id="{98110F21-59D2-41D7-85A0-DC77BC2F776B}"/>
+                <a16:creationId xmlns:a16="http://schemas.microsoft.com/office/drawing/2014/main" id="{1585AF65-1C94-4DC2-8FDF-A7E05F7D37B7}"/>
               </a:ext>
             </a:extLst>
           </p:cNvPr>
@@ -8524,8 +8552,8 @@
         </p:blipFill>
         <p:spPr>
           <a:xfrm>
-            <a:off x="7323137" y="3970234"/>
-            <a:ext cx="2752725" cy="2419350"/>
+            <a:off x="7266353" y="3606967"/>
+            <a:ext cx="3101609" cy="2568163"/>
           </a:xfrm>
           <a:prstGeom prst="rect">
             <a:avLst/>

</xml_diff>